<commit_message>
Updated PPT to create flash cards with current QR Code set
</commit_message>
<xml_diff>
--- a/QR_Codes/QR_FlashCards.pptx
+++ b/QR_Codes/QR_FlashCards.pptx
@@ -2980,7 +2980,7 @@
         </p:nvSpPr>
         <p:spPr>
           <a:xfrm>
-            <a:off x="741216" y="243776"/>
+            <a:off x="788228" y="243776"/>
             <a:ext cx="1607127" cy="369332"/>
           </a:xfrm>
           <a:prstGeom prst="rect">
@@ -3011,7 +3011,7 @@
         </p:nvSpPr>
         <p:spPr>
           <a:xfrm>
-            <a:off x="4344058" y="243776"/>
+            <a:off x="4465946" y="243776"/>
             <a:ext cx="1607127" cy="369332"/>
           </a:xfrm>
           <a:prstGeom prst="rect">
@@ -3042,7 +3042,7 @@
         </p:nvSpPr>
         <p:spPr>
           <a:xfrm>
-            <a:off x="741216" y="4936178"/>
+            <a:off x="788228" y="4936178"/>
             <a:ext cx="1607127" cy="369332"/>
           </a:xfrm>
           <a:prstGeom prst="rect">
@@ -3073,7 +3073,7 @@
         </p:nvSpPr>
         <p:spPr>
           <a:xfrm>
-            <a:off x="4344058" y="4927848"/>
+            <a:off x="4465946" y="4927848"/>
             <a:ext cx="1607127" cy="369332"/>
           </a:xfrm>
           <a:prstGeom prst="rect">
@@ -3118,7 +3118,7 @@
         </p:blipFill>
         <p:spPr>
           <a:xfrm>
-            <a:off x="175819" y="775855"/>
+            <a:off x="3300" y="775855"/>
             <a:ext cx="3176982" cy="3176982"/>
           </a:xfrm>
           <a:prstGeom prst="rect">
@@ -3148,7 +3148,7 @@
         </p:blipFill>
         <p:spPr>
           <a:xfrm>
-            <a:off x="3560122" y="775855"/>
+            <a:off x="3681018" y="775855"/>
             <a:ext cx="3176982" cy="3176982"/>
           </a:xfrm>
           <a:prstGeom prst="rect">
@@ -3178,7 +3178,7 @@
         </p:blipFill>
         <p:spPr>
           <a:xfrm>
-            <a:off x="169219" y="5643358"/>
+            <a:off x="3300" y="5643358"/>
             <a:ext cx="3176982" cy="3176982"/>
           </a:xfrm>
           <a:prstGeom prst="rect">
@@ -3208,7 +3208,7 @@
         </p:blipFill>
         <p:spPr>
           <a:xfrm>
-            <a:off x="3560122" y="5643358"/>
+            <a:off x="3681018" y="5643358"/>
             <a:ext cx="3176982" cy="3176982"/>
           </a:xfrm>
           <a:prstGeom prst="rect">
@@ -3254,7 +3254,7 @@
         </p:nvSpPr>
         <p:spPr>
           <a:xfrm>
-            <a:off x="741217" y="775855"/>
+            <a:off x="741216" y="775855"/>
             <a:ext cx="1769754" cy="369332"/>
           </a:xfrm>
           <a:prstGeom prst="rect">
@@ -3285,7 +3285,7 @@
         </p:nvSpPr>
         <p:spPr>
           <a:xfrm>
-            <a:off x="4299486" y="775855"/>
+            <a:off x="4393024" y="775855"/>
             <a:ext cx="1738457" cy="369332"/>
           </a:xfrm>
           <a:prstGeom prst="rect">
@@ -3330,7 +3330,7 @@
         </p:blipFill>
         <p:spPr>
           <a:xfrm>
-            <a:off x="132275" y="1248228"/>
+            <a:off x="30346" y="1248227"/>
             <a:ext cx="3191495" cy="3191495"/>
           </a:xfrm>
           <a:prstGeom prst="rect">
@@ -3360,7 +3360,7 @@
         </p:blipFill>
         <p:spPr>
           <a:xfrm>
-            <a:off x="3535135" y="1248227"/>
+            <a:off x="3666505" y="1248227"/>
             <a:ext cx="3191495" cy="3191495"/>
           </a:xfrm>
           <a:prstGeom prst="rect">

</xml_diff>